<commit_message>
VERY minor changes to poster
Moved android mention to overview, changed android section to results
section
</commit_message>
<xml_diff>
--- a/PosterTemplate.pptx
+++ b/PosterTemplate.pptx
@@ -7442,8 +7442,8 @@
         </p:nvSpPr>
         <p:spPr>
           <a:xfrm>
-            <a:off x="19735800" y="18719429"/>
-            <a:ext cx="12703175" cy="2868189"/>
+            <a:off x="19735800" y="19024230"/>
+            <a:ext cx="12703175" cy="2563388"/>
           </a:xfrm>
           <a:prstGeom prst="roundRect">
             <a:avLst>
@@ -7499,7 +7499,7 @@
         </p:nvSpPr>
         <p:spPr bwMode="auto">
           <a:xfrm>
-            <a:off x="19850098" y="18795630"/>
+            <a:off x="19850098" y="19100430"/>
             <a:ext cx="12336463" cy="863970"/>
           </a:xfrm>
           <a:prstGeom prst="rect">
@@ -7663,7 +7663,7 @@
         <p:spPr>
           <a:xfrm>
             <a:off x="19735800" y="7294681"/>
-            <a:ext cx="12703175" cy="7609967"/>
+            <a:ext cx="12703175" cy="8554919"/>
           </a:xfrm>
           <a:prstGeom prst="roundRect">
             <a:avLst>
@@ -7866,7 +7866,7 @@
               <a:rPr kumimoji="0" lang="en-US" altLang="zh-TW" sz="5100" b="1" dirty="0" smtClean="0">
                 <a:latin typeface="Helvetica" panose="020B0604020202020204" pitchFamily="34" charset="0"/>
               </a:rPr>
-              <a:t>Android Application</a:t>
+              <a:t>Results</a:t>
             </a:r>
             <a:endParaRPr kumimoji="0" lang="zh-TW" altLang="en-US" sz="5100" b="1" dirty="0">
               <a:latin typeface="Helvetica" panose="020B0604020202020204" pitchFamily="34" charset="0"/>
@@ -7902,7 +7902,15 @@
             </a:r>
             <a:r>
               <a:rPr lang="en-US" sz="4000" dirty="0" smtClean="0"/>
-              <a:t> is a low-level markup and programming language that produces aesthetically pleasing PDF documents with diverse content. This project aims to analyze the layout of mobile images of </a:t>
+              <a:t> is a low-level markup and programming language that produces aesthetically pleasing PDF documents with diverse content. This project aims to analyze the layout of </a:t>
+            </a:r>
+            <a:r>
+              <a:rPr lang="en-US" sz="4000" dirty="0" smtClean="0"/>
+              <a:t>mobile images </a:t>
+            </a:r>
+            <a:r>
+              <a:rPr lang="en-US" sz="4000" dirty="0" smtClean="0"/>
+              <a:t>of </a:t>
             </a:r>
             <a:r>
               <a:rPr lang="en-US" sz="4000" dirty="0" err="1" smtClean="0"/>
@@ -7918,7 +7926,15 @@
             </a:r>
             <a:r>
               <a:rPr lang="en-US" sz="4000" dirty="0" smtClean="0"/>
-              <a:t> source code.</a:t>
+              <a:t> source code</a:t>
+            </a:r>
+            <a:r>
+              <a:rPr lang="en-US" sz="4000" dirty="0" smtClean="0"/>
+              <a:t>. Input is captured from an Android phone</a:t>
+            </a:r>
+            <a:r>
+              <a:rPr lang="en-US" sz="4000" dirty="0" smtClean="0"/>
+              <a:t>, and the results are computed on a server.</a:t>
             </a:r>
             <a:endParaRPr lang="en-US" sz="4000" dirty="0"/>
           </a:p>
@@ -7954,8 +7970,8 @@
         </p:nvSpPr>
         <p:spPr>
           <a:xfrm>
-            <a:off x="19964399" y="19735800"/>
-            <a:ext cx="12107863" cy="1569660"/>
+            <a:off x="19964399" y="19888200"/>
+            <a:ext cx="12336464" cy="1569660"/>
           </a:xfrm>
           <a:prstGeom prst="rect">
             <a:avLst/>
@@ -9908,57 +9924,14 @@
       </p:sp>
       <p:sp>
         <p:nvSpPr>
-          <p:cNvPr id="57" name="TextBox 56"/>
-          <p:cNvSpPr txBox="1"/>
-          <p:nvPr/>
-        </p:nvSpPr>
-        <p:spPr>
-          <a:xfrm>
-            <a:off x="20802600" y="8534398"/>
-            <a:ext cx="10972800" cy="5816977"/>
-          </a:xfrm>
-          <a:prstGeom prst="rect">
-            <a:avLst/>
-          </a:prstGeom>
-          <a:noFill/>
-        </p:spPr>
-        <p:txBody>
-          <a:bodyPr wrap="square" rtlCol="0">
-            <a:spAutoFit/>
-          </a:bodyPr>
-          <a:lstStyle/>
-          <a:p>
-            <a:r>
-              <a:rPr lang="en-US" dirty="0" smtClean="0"/>
-              <a:t>Screenshot of Something w/ phone</a:t>
-            </a:r>
-            <a:endParaRPr lang="en-US" dirty="0"/>
-          </a:p>
-          <a:p>
-            <a:r>
-              <a:rPr lang="en-US" dirty="0" smtClean="0"/>
-              <a:t>Mention server use?</a:t>
-            </a:r>
-          </a:p>
-          <a:p>
-            <a:r>
-              <a:rPr lang="en-US" dirty="0" smtClean="0"/>
-              <a:t>Or perhaps this section should just be results beyond what methodology shows?</a:t>
-            </a:r>
-            <a:endParaRPr lang="en-US" dirty="0"/>
-          </a:p>
-        </p:txBody>
-      </p:sp>
-      <p:sp>
-        <p:nvSpPr>
           <p:cNvPr id="66" name="Rounded Rectangle 65"/>
           <p:cNvSpPr/>
           <p:nvPr/>
         </p:nvSpPr>
         <p:spPr>
           <a:xfrm>
-            <a:off x="19735800" y="15240001"/>
-            <a:ext cx="12703175" cy="3200400"/>
+            <a:off x="19735800" y="16128630"/>
+            <a:ext cx="12703175" cy="2616570"/>
           </a:xfrm>
           <a:prstGeom prst="roundRect">
             <a:avLst>
@@ -10014,7 +9987,7 @@
         </p:nvSpPr>
         <p:spPr bwMode="auto">
           <a:xfrm>
-            <a:off x="19812000" y="15392400"/>
+            <a:off x="19896137" y="16128630"/>
             <a:ext cx="12336463" cy="863970"/>
           </a:xfrm>
           <a:prstGeom prst="rect">
@@ -10177,7 +10150,7 @@
         </p:nvSpPr>
         <p:spPr>
           <a:xfrm>
-            <a:off x="19964400" y="16230600"/>
+            <a:off x="19964400" y="16987897"/>
             <a:ext cx="12107863" cy="2062103"/>
           </a:xfrm>
           <a:prstGeom prst="rect">
@@ -10197,15 +10170,7 @@
             </a:pPr>
             <a:r>
               <a:rPr lang="en-US" sz="3200" dirty="0" smtClean="0"/>
-              <a:t>Use </a:t>
-            </a:r>
-            <a:r>
-              <a:rPr lang="en-US" sz="3200" dirty="0" smtClean="0"/>
-              <a:t>the results of layout decomposition to </a:t>
-            </a:r>
-            <a:r>
-              <a:rPr lang="en-US" sz="3200" dirty="0" smtClean="0"/>
-              <a:t>generate code for a </a:t>
+              <a:t>Use the results of layout decomposition to generate code for a </a:t>
             </a:r>
             <a:r>
               <a:rPr lang="en-US" sz="3200" dirty="0" err="1" smtClean="0"/>
@@ -10215,7 +10180,6 @@
               <a:rPr lang="en-US" sz="3200" dirty="0" smtClean="0"/>
               <a:t> template for the given document </a:t>
             </a:r>
-            <a:endParaRPr lang="en-US" sz="3200" dirty="0" smtClean="0"/>
           </a:p>
           <a:p>
             <a:pPr marL="514350" indent="-514350">
@@ -10231,10 +10195,9 @@
               <a:t>LaTeX</a:t>
             </a:r>
             <a:r>
-              <a:rPr lang="en-US" sz="3200" smtClean="0"/>
+              <a:rPr lang="en-US" sz="3200" dirty="0" smtClean="0"/>
               <a:t> document</a:t>
             </a:r>
-            <a:endParaRPr lang="en-US" sz="3200" dirty="0" smtClean="0"/>
           </a:p>
           <a:p>
             <a:endParaRPr lang="en-US" sz="3200" dirty="0"/>
@@ -10297,7 +10260,15 @@
             <a:pPr algn="ctr"/>
             <a:r>
               <a:rPr lang="en-US" sz="4000" dirty="0" smtClean="0"/>
-              <a:t>Threshold to classify</a:t>
+              <a:t>Threshold </a:t>
+            </a:r>
+            <a:r>
+              <a:rPr lang="en-US" sz="4000" smtClean="0"/>
+              <a:t>to </a:t>
+            </a:r>
+            <a:r>
+              <a:rPr lang="en-US" sz="4000" smtClean="0"/>
+              <a:t>classify ??</a:t>
             </a:r>
             <a:endParaRPr lang="en-US" sz="4000" dirty="0"/>
           </a:p>

</xml_diff>

<commit_message>
MWR call change in testScript for downsampling correctness
</commit_message>
<xml_diff>
--- a/PosterTemplate.pptx
+++ b/PosterTemplate.pptx
@@ -139,7 +139,7 @@
   </p:defaultTextStyle>
   <p:extLst>
     <p:ext uri="{EFAFB233-063F-42B5-8137-9DF3F51BA10A}">
-      <p15:sldGuideLst xmlns:p15="http://schemas.microsoft.com/office/powerpoint/2012/main">
+      <p15:sldGuideLst xmlns:p15="http://schemas.microsoft.com/office/powerpoint/2012/main" xmlns="">
         <p15:guide id="1" orient="horz" pos="6912">
           <p15:clr>
             <a:srgbClr val="A4A3A4"/>
@@ -3020,7 +3020,7 @@
             <a:fld id="{FF8BE305-F666-4D9A-8860-D06665B515FD}" type="slidenum">
               <a:rPr lang="zh-TW" altLang="en-US"/>
               <a:pPr/>
-              <a:t>‹#›</a:t>
+              <a:t>‹N°›</a:t>
             </a:fld>
             <a:endParaRPr lang="zh-TW" altLang="en-US"/>
           </a:p>
@@ -3666,7 +3666,7 @@
             <a:fld id="{FC662D1C-8278-4E0D-9A01-93183F3ECCA4}" type="slidenum">
               <a:rPr lang="zh-TW" altLang="en-US"/>
               <a:pPr/>
-              <a:t>‹#›</a:t>
+              <a:t>‹N°›</a:t>
             </a:fld>
             <a:endParaRPr lang="zh-TW" altLang="en-US"/>
           </a:p>
@@ -3858,7 +3858,7 @@
             <a:fld id="{C05C10A7-4B4A-4EEE-A770-431ED9DE8593}" type="slidenum">
               <a:rPr lang="zh-TW" altLang="en-US"/>
               <a:pPr/>
-              <a:t>‹#›</a:t>
+              <a:t>‹N°›</a:t>
             </a:fld>
             <a:endParaRPr lang="zh-TW" altLang="en-US"/>
           </a:p>
@@ -4060,7 +4060,7 @@
             <a:fld id="{6F407700-683C-4D81-A3B5-822CA16A035C}" type="slidenum">
               <a:rPr lang="zh-TW" altLang="en-US"/>
               <a:pPr/>
-              <a:t>‹#›</a:t>
+              <a:t>‹N°›</a:t>
             </a:fld>
             <a:endParaRPr lang="zh-TW" altLang="en-US"/>
           </a:p>
@@ -4252,7 +4252,7 @@
             <a:fld id="{F9AE8AB6-58A2-4693-A261-043812D82CF1}" type="slidenum">
               <a:rPr lang="zh-TW" altLang="en-US"/>
               <a:pPr/>
-              <a:t>‹#›</a:t>
+              <a:t>‹N°›</a:t>
             </a:fld>
             <a:endParaRPr lang="zh-TW" altLang="en-US"/>
           </a:p>
@@ -4520,7 +4520,7 @@
             <a:fld id="{C5635EE9-EA22-4A3A-80DA-A2255142BD45}" type="slidenum">
               <a:rPr lang="zh-TW" altLang="en-US"/>
               <a:pPr/>
-              <a:t>‹#›</a:t>
+              <a:t>‹N°›</a:t>
             </a:fld>
             <a:endParaRPr lang="zh-TW" altLang="en-US"/>
           </a:p>
@@ -4830,7 +4830,7 @@
             <a:fld id="{887D47FD-7EFA-4821-81A7-197D6399BE0C}" type="slidenum">
               <a:rPr lang="zh-TW" altLang="en-US"/>
               <a:pPr/>
-              <a:t>‹#›</a:t>
+              <a:t>‹N°›</a:t>
             </a:fld>
             <a:endParaRPr lang="zh-TW" altLang="en-US"/>
           </a:p>
@@ -5274,7 +5274,7 @@
             <a:fld id="{B9003291-25A5-4CD2-9101-E6EEC5BA2252}" type="slidenum">
               <a:rPr lang="zh-TW" altLang="en-US"/>
               <a:pPr/>
-              <a:t>‹#›</a:t>
+              <a:t>‹N°›</a:t>
             </a:fld>
             <a:endParaRPr lang="zh-TW" altLang="en-US"/>
           </a:p>
@@ -5414,7 +5414,7 @@
             <a:fld id="{CE07CDAB-EFE1-4158-BA05-F887FA50FFBD}" type="slidenum">
               <a:rPr lang="zh-TW" altLang="en-US"/>
               <a:pPr/>
-              <a:t>‹#›</a:t>
+              <a:t>‹N°›</a:t>
             </a:fld>
             <a:endParaRPr lang="zh-TW" altLang="en-US"/>
           </a:p>
@@ -5531,7 +5531,7 @@
             <a:fld id="{0673564B-CD08-4EF5-B757-593101DAF5AE}" type="slidenum">
               <a:rPr lang="zh-TW" altLang="en-US"/>
               <a:pPr/>
-              <a:t>‹#›</a:t>
+              <a:t>‹N°›</a:t>
             </a:fld>
             <a:endParaRPr lang="zh-TW" altLang="en-US"/>
           </a:p>
@@ -5830,7 +5830,7 @@
             <a:fld id="{B6F74B55-7C5B-4606-8D7C-F60AF07A94BD}" type="slidenum">
               <a:rPr lang="zh-TW" altLang="en-US"/>
               <a:pPr/>
-              <a:t>‹#›</a:t>
+              <a:t>‹N°›</a:t>
             </a:fld>
             <a:endParaRPr lang="zh-TW" altLang="en-US"/>
           </a:p>
@@ -6108,7 +6108,7 @@
             <a:fld id="{D1A1AC99-ACEB-4B13-9BE7-C183988FEC93}" type="slidenum">
               <a:rPr lang="zh-TW" altLang="en-US"/>
               <a:pPr/>
-              <a:t>‹#›</a:t>
+              <a:t>‹N°›</a:t>
             </a:fld>
             <a:endParaRPr lang="zh-TW" altLang="en-US"/>
           </a:p>
@@ -6430,7 +6430,7 @@
             <a:fld id="{FA0BC959-50B9-4608-BE39-435E59D73D7B}" type="slidenum">
               <a:rPr lang="zh-TW" altLang="en-US"/>
               <a:pPr/>
-              <a:t>‹#›</a:t>
+              <a:t>‹N°›</a:t>
             </a:fld>
             <a:endParaRPr lang="zh-TW" altLang="en-US"/>
           </a:p>
@@ -7896,6 +7896,7 @@
           </a:bodyPr>
           <a:lstStyle/>
           <a:p>
+            <a:pPr algn="just"/>
             <a:r>
               <a:rPr lang="en-US" sz="4000" dirty="0" err="1" smtClean="0"/>
               <a:t>LaTeX</a:t>
@@ -9717,11 +9718,7 @@
             <a:pPr algn="ctr"/>
             <a:r>
               <a:rPr lang="en-US" sz="4000" dirty="0" smtClean="0"/>
-              <a:t>Skew </a:t>
-            </a:r>
-            <a:r>
-              <a:rPr lang="en-US" sz="4000" dirty="0" smtClean="0"/>
-              <a:t>Correction</a:t>
+              <a:t>Skew Correction</a:t>
             </a:r>
             <a:endParaRPr lang="en-US" sz="4000" dirty="0"/>
           </a:p>

</xml_diff>